<commit_message>
Isashell Update to colour
</commit_message>
<xml_diff>
--- a/Pre_production/Documents/Workbook/Workbook 3.pptx
+++ b/Pre_production/Documents/Workbook/Workbook 3.pptx
@@ -156,7 +156,7 @@
 <file path=ppt/revisionInfo.xml><?xml version="1.0" encoding="utf-8"?>
 <p1510:revInfo xmlns:a="http://schemas.openxmlformats.org/drawingml/2006/main" xmlns:r="http://schemas.openxmlformats.org/officeDocument/2006/relationships" xmlns:p1510="http://schemas.microsoft.com/office/powerpoint/2015/10/main">
   <p1510:revLst>
-    <p1510:client id="{9F16BB2E-3C25-4FF4-B5D4-FD616C32DFD9}" v="40" dt="2023-10-24T00:10:54.279"/>
+    <p1510:client id="{9F16BB2E-3C25-4FF4-B5D4-FD616C32DFD9}" v="45" dt="2023-10-24T00:53:48.099"/>
   </p1510:revLst>
 </p1510:revInfo>
 </file>
@@ -10154,6 +10154,78 @@
           </a:p>
         </p:txBody>
       </p:sp>
+      <p:pic>
+        <p:nvPicPr>
+          <p:cNvPr id="3" name="Picture 2" descr="A drawing of a flower on lined paper&#10;&#10;Description automatically generated">
+            <a:extLst>
+              <a:ext uri="{FF2B5EF4-FFF2-40B4-BE49-F238E27FC236}">
+                <a16:creationId xmlns:a16="http://schemas.microsoft.com/office/drawing/2014/main" id="{43C25E83-38F9-482C-8496-76D86296EA0F}"/>
+              </a:ext>
+            </a:extLst>
+          </p:cNvPr>
+          <p:cNvPicPr>
+            <a:picLocks noChangeAspect="1"/>
+          </p:cNvPicPr>
+          <p:nvPr/>
+        </p:nvPicPr>
+        <p:blipFill>
+          <a:blip r:embed="rId3">
+            <a:extLst>
+              <a:ext uri="{28A0092B-C50C-407E-A947-70E740481C1C}">
+                <a14:useLocalDpi xmlns:a14="http://schemas.microsoft.com/office/drawing/2010/main" val="0"/>
+              </a:ext>
+            </a:extLst>
+          </a:blip>
+          <a:stretch>
+            <a:fillRect/>
+          </a:stretch>
+        </p:blipFill>
+        <p:spPr>
+          <a:xfrm>
+            <a:off x="5796136" y="1542521"/>
+            <a:ext cx="2361233" cy="3150660"/>
+          </a:xfrm>
+          <a:prstGeom prst="rect">
+            <a:avLst/>
+          </a:prstGeom>
+        </p:spPr>
+      </p:pic>
+      <p:pic>
+        <p:nvPicPr>
+          <p:cNvPr id="6" name="Picture 5" descr="A sketch on a notebook&#10;&#10;Description automatically generated">
+            <a:extLst>
+              <a:ext uri="{FF2B5EF4-FFF2-40B4-BE49-F238E27FC236}">
+                <a16:creationId xmlns:a16="http://schemas.microsoft.com/office/drawing/2014/main" id="{BFD475B1-9ED3-4280-A792-8C9D39D7978F}"/>
+              </a:ext>
+            </a:extLst>
+          </p:cNvPr>
+          <p:cNvPicPr>
+            <a:picLocks noChangeAspect="1"/>
+          </p:cNvPicPr>
+          <p:nvPr/>
+        </p:nvPicPr>
+        <p:blipFill>
+          <a:blip r:embed="rId4">
+            <a:extLst>
+              <a:ext uri="{28A0092B-C50C-407E-A947-70E740481C1C}">
+                <a14:useLocalDpi xmlns:a14="http://schemas.microsoft.com/office/drawing/2010/main" val="0"/>
+              </a:ext>
+            </a:extLst>
+          </a:blip>
+          <a:stretch>
+            <a:fillRect/>
+          </a:stretch>
+        </p:blipFill>
+        <p:spPr>
+          <a:xfrm>
+            <a:off x="1331640" y="1542521"/>
+            <a:ext cx="2361233" cy="3150660"/>
+          </a:xfrm>
+          <a:prstGeom prst="rect">
+            <a:avLst/>
+          </a:prstGeom>
+        </p:spPr>
+      </p:pic>
     </p:spTree>
     <p:extLst>
       <p:ext uri="{BB962C8B-B14F-4D97-AF65-F5344CB8AC3E}">
@@ -10550,6 +10622,78 @@
           </a:p>
         </p:txBody>
       </p:sp>
+      <p:pic>
+        <p:nvPicPr>
+          <p:cNvPr id="3" name="Picture 2" descr="A drawing of a flower on lined paper&#10;&#10;Description automatically generated">
+            <a:extLst>
+              <a:ext uri="{FF2B5EF4-FFF2-40B4-BE49-F238E27FC236}">
+                <a16:creationId xmlns:a16="http://schemas.microsoft.com/office/drawing/2014/main" id="{0A599A86-E6C1-4B95-B8BA-1EE12FD054C4}"/>
+              </a:ext>
+            </a:extLst>
+          </p:cNvPr>
+          <p:cNvPicPr>
+            <a:picLocks noChangeAspect="1"/>
+          </p:cNvPicPr>
+          <p:nvPr/>
+        </p:nvPicPr>
+        <p:blipFill>
+          <a:blip r:embed="rId3">
+            <a:extLst>
+              <a:ext uri="{28A0092B-C50C-407E-A947-70E740481C1C}">
+                <a14:useLocalDpi xmlns:a14="http://schemas.microsoft.com/office/drawing/2010/main" val="0"/>
+              </a:ext>
+            </a:extLst>
+          </a:blip>
+          <a:stretch>
+            <a:fillRect/>
+          </a:stretch>
+        </p:blipFill>
+        <p:spPr>
+          <a:xfrm>
+            <a:off x="6228184" y="1753056"/>
+            <a:ext cx="1928679" cy="2573491"/>
+          </a:xfrm>
+          <a:prstGeom prst="rect">
+            <a:avLst/>
+          </a:prstGeom>
+        </p:spPr>
+      </p:pic>
+      <p:pic>
+        <p:nvPicPr>
+          <p:cNvPr id="9" name="Picture 8" descr="A drawing of an object and an object on lined paper&#10;&#10;Description automatically generated">
+            <a:extLst>
+              <a:ext uri="{FF2B5EF4-FFF2-40B4-BE49-F238E27FC236}">
+                <a16:creationId xmlns:a16="http://schemas.microsoft.com/office/drawing/2014/main" id="{E3D1C5C8-2254-43DF-8B76-2DA4E378FD1F}"/>
+              </a:ext>
+            </a:extLst>
+          </p:cNvPr>
+          <p:cNvPicPr>
+            <a:picLocks noChangeAspect="1"/>
+          </p:cNvPicPr>
+          <p:nvPr/>
+        </p:nvPicPr>
+        <p:blipFill>
+          <a:blip r:embed="rId4">
+            <a:extLst>
+              <a:ext uri="{28A0092B-C50C-407E-A947-70E740481C1C}">
+                <a14:useLocalDpi xmlns:a14="http://schemas.microsoft.com/office/drawing/2010/main" val="0"/>
+              </a:ext>
+            </a:extLst>
+          </a:blip>
+          <a:stretch>
+            <a:fillRect/>
+          </a:stretch>
+        </p:blipFill>
+        <p:spPr>
+          <a:xfrm>
+            <a:off x="4121422" y="1753056"/>
+            <a:ext cx="2089271" cy="2787774"/>
+          </a:xfrm>
+          <a:prstGeom prst="rect">
+            <a:avLst/>
+          </a:prstGeom>
+        </p:spPr>
+      </p:pic>
     </p:spTree>
     <p:extLst>
       <p:ext uri="{BB962C8B-B14F-4D97-AF65-F5344CB8AC3E}">
@@ -11185,6 +11329,42 @@
           </a:p>
         </p:txBody>
       </p:sp>
+      <p:pic>
+        <p:nvPicPr>
+          <p:cNvPr id="3" name="Picture 2" descr="A sketchbook of a cartoon character&#10;&#10;Description automatically generated">
+            <a:extLst>
+              <a:ext uri="{FF2B5EF4-FFF2-40B4-BE49-F238E27FC236}">
+                <a16:creationId xmlns:a16="http://schemas.microsoft.com/office/drawing/2014/main" id="{4FCB1CA7-2F07-45BF-AEF2-1CFDC3B3B578}"/>
+              </a:ext>
+            </a:extLst>
+          </p:cNvPr>
+          <p:cNvPicPr>
+            <a:picLocks noChangeAspect="1"/>
+          </p:cNvPicPr>
+          <p:nvPr/>
+        </p:nvPicPr>
+        <p:blipFill>
+          <a:blip r:embed="rId3">
+            <a:extLst>
+              <a:ext uri="{28A0092B-C50C-407E-A947-70E740481C1C}">
+                <a14:useLocalDpi xmlns:a14="http://schemas.microsoft.com/office/drawing/2010/main" val="0"/>
+              </a:ext>
+            </a:extLst>
+          </a:blip>
+          <a:stretch>
+            <a:fillRect/>
+          </a:stretch>
+        </p:blipFill>
+        <p:spPr>
+          <a:xfrm rot="16200000">
+            <a:off x="2478505" y="573936"/>
+            <a:ext cx="3662846" cy="4887439"/>
+          </a:xfrm>
+          <a:prstGeom prst="rect">
+            <a:avLst/>
+          </a:prstGeom>
+        </p:spPr>
+      </p:pic>
     </p:spTree>
     <p:extLst>
       <p:ext uri="{BB962C8B-B14F-4D97-AF65-F5344CB8AC3E}">
@@ -20866,6 +21046,12 @@
 </file>
 
 <file path=customXml/item1.xml><?xml version="1.0" encoding="utf-8"?>
+<Control xmlns="http://schemas.microsoft.com/VisualStudio/2011/storyboarding/control">
+  <Id Name="System.Storyboarding.Common.DataGrid" Revision="1" Stencil="System.Storyboarding.Common" StencilVersion="0.1"/>
+</Control>
+</file>
+
+<file path=customXml/item2.xml><?xml version="1.0" encoding="utf-8"?>
 <ct:contentTypeSchema xmlns:ct="http://schemas.microsoft.com/office/2006/metadata/contentType" xmlns:ma="http://schemas.microsoft.com/office/2006/metadata/properties/metaAttributes" ct:_="" ma:_="" ma:contentTypeName="Document" ma:contentTypeID="0x0101004E9941BE3AE4394DB476583126CF51B1" ma:contentTypeVersion="12" ma:contentTypeDescription="Create a new document." ma:contentTypeScope="" ma:versionID="558cc00f569e1b2ecdbc00250f3bf903">
   <xsd:schema xmlns:xsd="http://www.w3.org/2001/XMLSchema" xmlns:xs="http://www.w3.org/2001/XMLSchema" xmlns:p="http://schemas.microsoft.com/office/2006/metadata/properties" xmlns:ns3="f7e03a58-dfd9-4c0f-a1e1-20265f9f556c" xmlns:ns4="1bd2fcbb-1eee-47b4-8408-fd03f14fa890" targetNamespace="http://schemas.microsoft.com/office/2006/metadata/properties" ma:root="true" ma:fieldsID="a23c5bcc54103d441f5ec9815cdf2e9f" ns3:_="" ns4:_="">
     <xsd:import namespace="f7e03a58-dfd9-4c0f-a1e1-20265f9f556c"/>
@@ -21080,21 +21266,7 @@
 </ct:contentTypeSchema>
 </file>
 
-<file path=customXml/item2.xml><?xml version="1.0" encoding="utf-8"?>
-<Control xmlns="http://schemas.microsoft.com/VisualStudio/2011/storyboarding/control">
-  <Id Name="System.Storyboarding.Common.DataGrid" Revision="1" Stencil="System.Storyboarding.Common" StencilVersion="0.1"/>
-</Control>
-</file>
-
 <file path=customXml/item3.xml><?xml version="1.0" encoding="utf-8"?>
-<p:properties xmlns:p="http://schemas.microsoft.com/office/2006/metadata/properties" xmlns:xsi="http://www.w3.org/2001/XMLSchema-instance" xmlns:pc="http://schemas.microsoft.com/office/infopath/2007/PartnerControls">
-  <documentManagement>
-    <_activity xmlns="1bd2fcbb-1eee-47b4-8408-fd03f14fa890" xsi:nil="true"/>
-  </documentManagement>
-</p:properties>
-</file>
-
-<file path=customXml/item4.xml><?xml version="1.0" encoding="utf-8"?>
 <?mso-contentType ?>
 <FormTemplates xmlns="http://schemas.microsoft.com/sharepoint/v3/contenttype/forms">
   <Display>DocumentLibraryForm</Display>
@@ -21103,7 +21275,23 @@
 </FormTemplates>
 </file>
 
+<file path=customXml/item4.xml><?xml version="1.0" encoding="utf-8"?>
+<p:properties xmlns:p="http://schemas.microsoft.com/office/2006/metadata/properties" xmlns:xsi="http://www.w3.org/2001/XMLSchema-instance" xmlns:pc="http://schemas.microsoft.com/office/infopath/2007/PartnerControls">
+  <documentManagement>
+    <_activity xmlns="1bd2fcbb-1eee-47b4-8408-fd03f14fa890" xsi:nil="true"/>
+  </documentManagement>
+</p:properties>
+</file>
+
 <file path=customXml/itemProps1.xml><?xml version="1.0" encoding="utf-8"?>
+<ds:datastoreItem xmlns:ds="http://schemas.openxmlformats.org/officeDocument/2006/customXml" ds:itemID="{1748F941-C1C1-44CD-BA90-1320E6EC290C}">
+  <ds:schemaRefs>
+    <ds:schemaRef ds:uri="http://schemas.microsoft.com/VisualStudio/2011/storyboarding/control"/>
+  </ds:schemaRefs>
+</ds:datastoreItem>
+</file>
+
+<file path=customXml/itemProps2.xml><?xml version="1.0" encoding="utf-8"?>
 <ds:datastoreItem xmlns:ds="http://schemas.openxmlformats.org/officeDocument/2006/customXml" ds:itemID="{6FF1E75B-1BB9-422C-8FDD-F869FE3A1645}">
   <ds:schemaRefs>
     <ds:schemaRef ds:uri="http://schemas.microsoft.com/office/2006/metadata/contentType"/>
@@ -21122,15 +21310,15 @@
 </ds:datastoreItem>
 </file>
 
-<file path=customXml/itemProps2.xml><?xml version="1.0" encoding="utf-8"?>
-<ds:datastoreItem xmlns:ds="http://schemas.openxmlformats.org/officeDocument/2006/customXml" ds:itemID="{1748F941-C1C1-44CD-BA90-1320E6EC290C}">
+<file path=customXml/itemProps3.xml><?xml version="1.0" encoding="utf-8"?>
+<ds:datastoreItem xmlns:ds="http://schemas.openxmlformats.org/officeDocument/2006/customXml" ds:itemID="{9138D98A-98B5-489E-9436-656CF7296A97}">
   <ds:schemaRefs>
-    <ds:schemaRef ds:uri="http://schemas.microsoft.com/VisualStudio/2011/storyboarding/control"/>
+    <ds:schemaRef ds:uri="http://schemas.microsoft.com/sharepoint/v3/contenttype/forms"/>
   </ds:schemaRefs>
 </ds:datastoreItem>
 </file>
 
-<file path=customXml/itemProps3.xml><?xml version="1.0" encoding="utf-8"?>
+<file path=customXml/itemProps4.xml><?xml version="1.0" encoding="utf-8"?>
 <ds:datastoreItem xmlns:ds="http://schemas.openxmlformats.org/officeDocument/2006/customXml" ds:itemID="{A1764301-5F1A-4BE5-B1B2-866709E2C2D6}">
   <ds:schemaRefs>
     <ds:schemaRef ds:uri="http://schemas.openxmlformats.org/package/2006/metadata/core-properties"/>
@@ -21145,12 +21333,4 @@
     <ds:schemaRef ds:uri="http://purl.org/dc/elements/1.1/"/>
   </ds:schemaRefs>
 </ds:datastoreItem>
-</file>
-
-<file path=customXml/itemProps4.xml><?xml version="1.0" encoding="utf-8"?>
-<ds:datastoreItem xmlns:ds="http://schemas.openxmlformats.org/officeDocument/2006/customXml" ds:itemID="{9138D98A-98B5-489E-9436-656CF7296A97}">
-  <ds:schemaRefs>
-    <ds:schemaRef ds:uri="http://schemas.microsoft.com/sharepoint/v3/contenttype/forms"/>
-  </ds:schemaRefs>
-</ds:datastoreItem>
 </file>
</xml_diff>